<commit_message>
Nao vais mais conseguir compilar - de novo :)
</commit_message>
<xml_diff>
--- a/Docs/TrabFinal.pptx
+++ b/Docs/TrabFinal.pptx
@@ -7,6 +7,13 @@
   <p:sldIdLst>
     <p:sldId id="256" r:id="rId2"/>
     <p:sldId id="257" r:id="rId3"/>
+    <p:sldId id="258" r:id="rId4"/>
+    <p:sldId id="259" r:id="rId5"/>
+    <p:sldId id="261" r:id="rId6"/>
+    <p:sldId id="260" r:id="rId7"/>
+    <p:sldId id="262" r:id="rId8"/>
+    <p:sldId id="263" r:id="rId9"/>
+    <p:sldId id="264" r:id="rId10"/>
   </p:sldIdLst>
   <p:sldSz cx="9144000" cy="6858000" type="screen4x3"/>
   <p:notesSz cx="6858000" cy="9144000"/>
@@ -356,7 +363,7 @@
           <a:p>
             <a:fld id="{2E700DB3-DBF0-4086-B675-117E7A9610B8}" type="datetimeFigureOut">
               <a:rPr lang="pt-BR" smtClean="0"/>
-              <a:t>13/07/2011</a:t>
+              <a:t>14/07/2011</a:t>
             </a:fld>
             <a:endParaRPr lang="pt-BR"/>
           </a:p>
@@ -579,7 +586,7 @@
           <a:p>
             <a:fld id="{2E700DB3-DBF0-4086-B675-117E7A9610B8}" type="datetimeFigureOut">
               <a:rPr lang="pt-BR" smtClean="0"/>
-              <a:t>13/07/2011</a:t>
+              <a:t>14/07/2011</a:t>
             </a:fld>
             <a:endParaRPr lang="pt-BR"/>
           </a:p>
@@ -859,7 +866,7 @@
           <a:p>
             <a:fld id="{2E700DB3-DBF0-4086-B675-117E7A9610B8}" type="datetimeFigureOut">
               <a:rPr lang="pt-BR" smtClean="0"/>
-              <a:t>13/07/2011</a:t>
+              <a:t>14/07/2011</a:t>
             </a:fld>
             <a:endParaRPr lang="pt-BR"/>
           </a:p>
@@ -1038,7 +1045,7 @@
           <a:p>
             <a:fld id="{2E700DB3-DBF0-4086-B675-117E7A9610B8}" type="datetimeFigureOut">
               <a:rPr lang="pt-BR" smtClean="0"/>
-              <a:t>13/07/2011</a:t>
+              <a:t>14/07/2011</a:t>
             </a:fld>
             <a:endParaRPr lang="pt-BR"/>
           </a:p>
@@ -1396,7 +1403,7 @@
           <a:p>
             <a:fld id="{2E700DB3-DBF0-4086-B675-117E7A9610B8}" type="datetimeFigureOut">
               <a:rPr lang="pt-BR" smtClean="0"/>
-              <a:t>13/07/2011</a:t>
+              <a:t>14/07/2011</a:t>
             </a:fld>
             <a:endParaRPr lang="pt-BR"/>
           </a:p>
@@ -1683,7 +1690,7 @@
           <a:p>
             <a:fld id="{2E700DB3-DBF0-4086-B675-117E7A9610B8}" type="datetimeFigureOut">
               <a:rPr lang="pt-BR" smtClean="0"/>
-              <a:t>13/07/2011</a:t>
+              <a:t>14/07/2011</a:t>
             </a:fld>
             <a:endParaRPr lang="pt-BR"/>
           </a:p>
@@ -2105,7 +2112,7 @@
           <a:p>
             <a:fld id="{2E700DB3-DBF0-4086-B675-117E7A9610B8}" type="datetimeFigureOut">
               <a:rPr lang="pt-BR" smtClean="0"/>
-              <a:t>13/07/2011</a:t>
+              <a:t>14/07/2011</a:t>
             </a:fld>
             <a:endParaRPr lang="pt-BR"/>
           </a:p>
@@ -2220,7 +2227,7 @@
           <a:p>
             <a:fld id="{2E700DB3-DBF0-4086-B675-117E7A9610B8}" type="datetimeFigureOut">
               <a:rPr lang="pt-BR" smtClean="0"/>
-              <a:t>13/07/2011</a:t>
+              <a:t>14/07/2011</a:t>
             </a:fld>
             <a:endParaRPr lang="pt-BR"/>
           </a:p>
@@ -2310,7 +2317,7 @@
           <a:p>
             <a:fld id="{2E700DB3-DBF0-4086-B675-117E7A9610B8}" type="datetimeFigureOut">
               <a:rPr lang="pt-BR" smtClean="0"/>
-              <a:t>13/07/2011</a:t>
+              <a:t>14/07/2011</a:t>
             </a:fld>
             <a:endParaRPr lang="pt-BR"/>
           </a:p>
@@ -2588,7 +2595,7 @@
           <a:p>
             <a:fld id="{2E700DB3-DBF0-4086-B675-117E7A9610B8}" type="datetimeFigureOut">
               <a:rPr lang="pt-BR" smtClean="0"/>
-              <a:t>13/07/2011</a:t>
+              <a:t>14/07/2011</a:t>
             </a:fld>
             <a:endParaRPr lang="pt-BR"/>
           </a:p>
@@ -2954,7 +2961,7 @@
           <a:p>
             <a:fld id="{2E700DB3-DBF0-4086-B675-117E7A9610B8}" type="datetimeFigureOut">
               <a:rPr lang="pt-BR" smtClean="0"/>
-              <a:t>13/07/2011</a:t>
+              <a:t>14/07/2011</a:t>
             </a:fld>
             <a:endParaRPr lang="pt-BR"/>
           </a:p>
@@ -3391,7 +3398,7 @@
           <a:p>
             <a:fld id="{2E700DB3-DBF0-4086-B675-117E7A9610B8}" type="datetimeFigureOut">
               <a:rPr lang="pt-BR" smtClean="0"/>
-              <a:t>13/07/2011</a:t>
+              <a:t>14/07/2011</a:t>
             </a:fld>
             <a:endParaRPr lang="pt-BR"/>
           </a:p>
@@ -3903,7 +3910,7 @@
             <a:spLocks noGrp="1"/>
           </p:cNvSpPr>
           <p:nvPr>
-            <p:ph type="ctrTitle"/>
+            <p:ph type="title"/>
           </p:nvPr>
         </p:nvSpPr>
         <p:spPr/>
@@ -3913,7 +3920,7 @@
           <a:p>
             <a:r>
               <a:rPr lang="en-US" dirty="0" smtClean="0"/>
-              <a:t>Add Title Here</a:t>
+              <a:t>Motivation</a:t>
             </a:r>
             <a:endParaRPr lang="en-US" dirty="0"/>
           </a:p>
@@ -3921,12 +3928,12 @@
       </p:sp>
       <p:sp>
         <p:nvSpPr>
-          <p:cNvPr id="3" name="Subtítulo 2"/>
-          <p:cNvSpPr>
-            <a:spLocks noGrp="1"/>
-          </p:cNvSpPr>
-          <p:nvPr>
-            <p:ph type="subTitle" idx="1"/>
+          <p:cNvPr id="3" name="Espaço Reservado para Conteúdo 2"/>
+          <p:cNvSpPr>
+            <a:spLocks noGrp="1"/>
+          </p:cNvSpPr>
+          <p:nvPr>
+            <p:ph idx="1"/>
           </p:nvPr>
         </p:nvSpPr>
         <p:spPr/>
@@ -3935,40 +3942,1012 @@
           <a:lstStyle/>
           <a:p>
             <a:r>
+              <a:rPr lang="en-US" dirty="0"/>
+              <a:t>W</a:t>
+            </a:r>
+            <a:r>
               <a:rPr lang="en-US" dirty="0" smtClean="0"/>
-              <a:t>Felipe </a:t>
-            </a:r>
-            <a:r>
-              <a:rPr lang="en-US" dirty="0" err="1" smtClean="0"/>
-              <a:t>Cecagno</a:t>
-            </a:r>
-            <a:endParaRPr lang="en-US" dirty="0" smtClean="0"/>
-          </a:p>
-          <a:p>
-            <a:r>
-              <a:rPr lang="en-US" dirty="0" err="1" smtClean="0"/>
-              <a:t>Rosália</a:t>
+              <a:t>orldwide </a:t>
+            </a:r>
+            <a:r>
+              <a:rPr lang="en-US" dirty="0"/>
+              <a:t>e-learning industry is estimated to be worth </a:t>
             </a:r>
             <a:r>
               <a:rPr lang="en-US" dirty="0" smtClean="0"/>
-              <a:t> </a:t>
-            </a:r>
-            <a:r>
-              <a:rPr lang="en-US" dirty="0" err="1" smtClean="0"/>
-              <a:t>Galiazzi</a:t>
-            </a:r>
+              <a:t>over 48 billion dollars</a:t>
+            </a:r>
+          </a:p>
+          <a:p>
+            <a:endParaRPr lang="en-US" dirty="0"/>
+          </a:p>
+          <a:p>
             <a:r>
               <a:rPr lang="en-US" dirty="0" smtClean="0"/>
-              <a:t> Schneider</a:t>
+              <a:t>Create more intuitive navigation on e-learning videos</a:t>
             </a:r>
             <a:endParaRPr lang="en-US" dirty="0"/>
           </a:p>
         </p:txBody>
       </p:sp>
+      <p:pic>
+        <p:nvPicPr>
+          <p:cNvPr id="4" name="Picture 4"/>
+          <p:cNvPicPr>
+            <a:picLocks noChangeAspect="1" noChangeArrowheads="1"/>
+          </p:cNvPicPr>
+          <p:nvPr/>
+        </p:nvPicPr>
+        <p:blipFill>
+          <a:blip r:embed="rId2">
+            <a:extLst>
+              <a:ext uri="{28A0092B-C50C-407E-A947-70E740481C1C}">
+                <a14:useLocalDpi xmlns:a14="http://schemas.microsoft.com/office/drawing/2010/main" val="0"/>
+              </a:ext>
+            </a:extLst>
+          </a:blip>
+          <a:srcRect/>
+          <a:stretch>
+            <a:fillRect/>
+          </a:stretch>
+        </p:blipFill>
+        <p:spPr bwMode="auto">
+          <a:xfrm>
+            <a:off x="1835696" y="4653135"/>
+            <a:ext cx="5537326" cy="1906183"/>
+          </a:xfrm>
+          <a:prstGeom prst="rect">
+            <a:avLst/>
+          </a:prstGeom>
+          <a:noFill/>
+          <a:ln>
+            <a:noFill/>
+          </a:ln>
+          <a:effectLst/>
+          <a:extLst>
+            <a:ext uri="{909E8E84-426E-40DD-AFC4-6F175D3DCCD1}">
+              <a14:hiddenFill xmlns:a14="http://schemas.microsoft.com/office/drawing/2010/main">
+                <a:solidFill>
+                  <a:schemeClr val="accent1"/>
+                </a:solidFill>
+              </a14:hiddenFill>
+            </a:ext>
+            <a:ext uri="{91240B29-F687-4F45-9708-019B960494DF}">
+              <a14:hiddenLine xmlns:a14="http://schemas.microsoft.com/office/drawing/2010/main" w="9525">
+                <a:solidFill>
+                  <a:schemeClr val="tx1"/>
+                </a:solidFill>
+                <a:miter lim="800000"/>
+                <a:headEnd/>
+                <a:tailEnd/>
+              </a14:hiddenLine>
+            </a:ext>
+            <a:ext uri="{AF507438-7753-43E0-B8FC-AC1667EBCBE1}">
+              <a14:hiddenEffects xmlns:a14="http://schemas.microsoft.com/office/drawing/2010/main">
+                <a:effectLst>
+                  <a:outerShdw dist="35921" dir="2700000" algn="ctr" rotWithShape="0">
+                    <a:schemeClr val="bg2"/>
+                  </a:outerShdw>
+                </a:effectLst>
+              </a14:hiddenEffects>
+            </a:ext>
+          </a:extLst>
+        </p:spPr>
+      </p:pic>
     </p:spTree>
     <p:extLst>
       <p:ext uri="{BB962C8B-B14F-4D97-AF65-F5344CB8AC3E}">
-        <p14:creationId xmlns:p14="http://schemas.microsoft.com/office/powerpoint/2010/main" val="25229536"/>
+        <p14:creationId xmlns:p14="http://schemas.microsoft.com/office/powerpoint/2010/main" val="635745441"/>
+      </p:ext>
+    </p:extLst>
+  </p:cSld>
+  <p:clrMapOvr>
+    <a:masterClrMapping/>
+  </p:clrMapOvr>
+</p:sld>
+</file>
+
+<file path=ppt/slides/slide3.xml><?xml version="1.0" encoding="utf-8"?>
+<p:sld xmlns:a="http://schemas.openxmlformats.org/drawingml/2006/main" xmlns:r="http://schemas.openxmlformats.org/officeDocument/2006/relationships" xmlns:p="http://schemas.openxmlformats.org/presentationml/2006/main">
+  <p:cSld>
+    <p:spTree>
+      <p:nvGrpSpPr>
+        <p:cNvPr id="1" name=""/>
+        <p:cNvGrpSpPr/>
+        <p:nvPr/>
+      </p:nvGrpSpPr>
+      <p:grpSpPr>
+        <a:xfrm>
+          <a:off x="0" y="0"/>
+          <a:ext cx="0" cy="0"/>
+          <a:chOff x="0" y="0"/>
+          <a:chExt cx="0" cy="0"/>
+        </a:xfrm>
+      </p:grpSpPr>
+      <p:sp>
+        <p:nvSpPr>
+          <p:cNvPr id="2" name="Título 1"/>
+          <p:cNvSpPr>
+            <a:spLocks noGrp="1"/>
+          </p:cNvSpPr>
+          <p:nvPr>
+            <p:ph type="title"/>
+          </p:nvPr>
+        </p:nvSpPr>
+        <p:spPr/>
+        <p:txBody>
+          <a:bodyPr/>
+          <a:lstStyle/>
+          <a:p>
+            <a:r>
+              <a:rPr lang="en-US" dirty="0" smtClean="0"/>
+              <a:t>Related Work</a:t>
+            </a:r>
+            <a:endParaRPr lang="en-US" dirty="0"/>
+          </a:p>
+        </p:txBody>
+      </p:sp>
+      <p:sp>
+        <p:nvSpPr>
+          <p:cNvPr id="3" name="Espaço Reservado para Conteúdo 2"/>
+          <p:cNvSpPr>
+            <a:spLocks noGrp="1"/>
+          </p:cNvSpPr>
+          <p:nvPr>
+            <p:ph idx="1"/>
+          </p:nvPr>
+        </p:nvSpPr>
+        <p:spPr/>
+        <p:txBody>
+          <a:bodyPr/>
+          <a:lstStyle/>
+          <a:p>
+            <a:endParaRPr lang="en-US"/>
+          </a:p>
+        </p:txBody>
+      </p:sp>
+    </p:spTree>
+    <p:extLst>
+      <p:ext uri="{BB962C8B-B14F-4D97-AF65-F5344CB8AC3E}">
+        <p14:creationId xmlns:p14="http://schemas.microsoft.com/office/powerpoint/2010/main" val="1030316069"/>
+      </p:ext>
+    </p:extLst>
+  </p:cSld>
+  <p:clrMapOvr>
+    <a:masterClrMapping/>
+  </p:clrMapOvr>
+</p:sld>
+</file>
+
+<file path=ppt/slides/slide4.xml><?xml version="1.0" encoding="utf-8"?>
+<p:sld xmlns:a="http://schemas.openxmlformats.org/drawingml/2006/main" xmlns:r="http://schemas.openxmlformats.org/officeDocument/2006/relationships" xmlns:p="http://schemas.openxmlformats.org/presentationml/2006/main">
+  <p:cSld>
+    <p:spTree>
+      <p:nvGrpSpPr>
+        <p:cNvPr id="1" name=""/>
+        <p:cNvGrpSpPr/>
+        <p:nvPr/>
+      </p:nvGrpSpPr>
+      <p:grpSpPr>
+        <a:xfrm>
+          <a:off x="0" y="0"/>
+          <a:ext cx="0" cy="0"/>
+          <a:chOff x="0" y="0"/>
+          <a:chExt cx="0" cy="0"/>
+        </a:xfrm>
+      </p:grpSpPr>
+      <p:sp>
+        <p:nvSpPr>
+          <p:cNvPr id="2" name="Título 1"/>
+          <p:cNvSpPr>
+            <a:spLocks noGrp="1"/>
+          </p:cNvSpPr>
+          <p:nvPr>
+            <p:ph type="title"/>
+          </p:nvPr>
+        </p:nvSpPr>
+        <p:spPr/>
+        <p:txBody>
+          <a:bodyPr/>
+          <a:lstStyle/>
+          <a:p>
+            <a:r>
+              <a:rPr lang="en-US" dirty="0" smtClean="0"/>
+              <a:t>Overview</a:t>
+            </a:r>
+            <a:endParaRPr lang="en-US" dirty="0"/>
+          </a:p>
+        </p:txBody>
+      </p:sp>
+      <p:sp>
+        <p:nvSpPr>
+          <p:cNvPr id="3" name="Espaço Reservado para Conteúdo 2"/>
+          <p:cNvSpPr>
+            <a:spLocks noGrp="1"/>
+          </p:cNvSpPr>
+          <p:nvPr>
+            <p:ph idx="1"/>
+          </p:nvPr>
+        </p:nvSpPr>
+        <p:spPr/>
+        <p:txBody>
+          <a:bodyPr/>
+          <a:lstStyle/>
+          <a:p>
+            <a:r>
+              <a:rPr lang="en-US" dirty="0" smtClean="0"/>
+              <a:t>Algorithm takes 3 steps:</a:t>
+            </a:r>
+          </a:p>
+          <a:p>
+            <a:pPr lvl="1"/>
+            <a:r>
+              <a:rPr lang="en-US" dirty="0" smtClean="0"/>
+              <a:t>Point correspondence</a:t>
+            </a:r>
+          </a:p>
+          <a:p>
+            <a:pPr lvl="1"/>
+            <a:r>
+              <a:rPr lang="en-US" dirty="0" err="1" smtClean="0"/>
+              <a:t>Homography</a:t>
+            </a:r>
+            <a:r>
+              <a:rPr lang="en-US" dirty="0" smtClean="0"/>
+              <a:t> estimation</a:t>
+            </a:r>
+          </a:p>
+          <a:p>
+            <a:pPr lvl="1"/>
+            <a:r>
+              <a:rPr lang="en-US" dirty="0" smtClean="0"/>
+              <a:t>Video reproduction using transformed coordinates</a:t>
+            </a:r>
+          </a:p>
+        </p:txBody>
+      </p:sp>
+      <p:pic>
+        <p:nvPicPr>
+          <p:cNvPr id="1026" name="Picture 2"/>
+          <p:cNvPicPr>
+            <a:picLocks noChangeAspect="1" noChangeArrowheads="1"/>
+          </p:cNvPicPr>
+          <p:nvPr/>
+        </p:nvPicPr>
+        <p:blipFill>
+          <a:blip r:embed="rId2" cstate="print">
+            <a:extLst>
+              <a:ext uri="{28A0092B-C50C-407E-A947-70E740481C1C}">
+                <a14:useLocalDpi xmlns:a14="http://schemas.microsoft.com/office/drawing/2010/main" val="0"/>
+              </a:ext>
+            </a:extLst>
+          </a:blip>
+          <a:srcRect/>
+          <a:stretch>
+            <a:fillRect/>
+          </a:stretch>
+        </p:blipFill>
+        <p:spPr bwMode="auto">
+          <a:xfrm>
+            <a:off x="1547664" y="4869160"/>
+            <a:ext cx="1438289" cy="1618075"/>
+          </a:xfrm>
+          <a:prstGeom prst="rect">
+            <a:avLst/>
+          </a:prstGeom>
+          <a:noFill/>
+          <a:ln>
+            <a:noFill/>
+          </a:ln>
+          <a:effectLst/>
+          <a:extLst>
+            <a:ext uri="{909E8E84-426E-40DD-AFC4-6F175D3DCCD1}">
+              <a14:hiddenFill xmlns:a14="http://schemas.microsoft.com/office/drawing/2010/main">
+                <a:solidFill>
+                  <a:schemeClr val="accent1"/>
+                </a:solidFill>
+              </a14:hiddenFill>
+            </a:ext>
+            <a:ext uri="{91240B29-F687-4F45-9708-019B960494DF}">
+              <a14:hiddenLine xmlns:a14="http://schemas.microsoft.com/office/drawing/2010/main" w="9525">
+                <a:solidFill>
+                  <a:schemeClr val="tx1"/>
+                </a:solidFill>
+                <a:miter lim="800000"/>
+                <a:headEnd/>
+                <a:tailEnd/>
+              </a14:hiddenLine>
+            </a:ext>
+            <a:ext uri="{AF507438-7753-43E0-B8FC-AC1667EBCBE1}">
+              <a14:hiddenEffects xmlns:a14="http://schemas.microsoft.com/office/drawing/2010/main">
+                <a:effectLst>
+                  <a:outerShdw dist="35921" dir="2700000" algn="ctr" rotWithShape="0">
+                    <a:schemeClr val="bg2"/>
+                  </a:outerShdw>
+                </a:effectLst>
+              </a14:hiddenEffects>
+            </a:ext>
+          </a:extLst>
+        </p:spPr>
+      </p:pic>
+      <p:sp>
+        <p:nvSpPr>
+          <p:cNvPr id="4" name="Seta para a direita 3"/>
+          <p:cNvSpPr/>
+          <p:nvPr/>
+        </p:nvSpPr>
+        <p:spPr>
+          <a:xfrm>
+            <a:off x="3419872" y="5517232"/>
+            <a:ext cx="864096" cy="432048"/>
+          </a:xfrm>
+          <a:prstGeom prst="rightArrow">
+            <a:avLst/>
+          </a:prstGeom>
+          <a:solidFill>
+            <a:schemeClr val="accent1">
+              <a:lumMod val="60000"/>
+              <a:lumOff val="40000"/>
+            </a:schemeClr>
+          </a:solidFill>
+          <a:ln>
+            <a:solidFill>
+              <a:schemeClr val="accent1"/>
+            </a:solidFill>
+          </a:ln>
+        </p:spPr>
+        <p:style>
+          <a:lnRef idx="2">
+            <a:schemeClr val="accent1">
+              <a:shade val="50000"/>
+            </a:schemeClr>
+          </a:lnRef>
+          <a:fillRef idx="1">
+            <a:schemeClr val="accent1"/>
+          </a:fillRef>
+          <a:effectRef idx="0">
+            <a:schemeClr val="accent1"/>
+          </a:effectRef>
+          <a:fontRef idx="minor">
+            <a:schemeClr val="lt1"/>
+          </a:fontRef>
+        </p:style>
+        <p:txBody>
+          <a:bodyPr rtlCol="0" anchor="ctr"/>
+          <a:lstStyle/>
+          <a:p>
+            <a:pPr algn="ctr"/>
+            <a:endParaRPr lang="en-US"/>
+          </a:p>
+        </p:txBody>
+      </p:sp>
+      <p:pic>
+        <p:nvPicPr>
+          <p:cNvPr id="1028" name="Picture 4"/>
+          <p:cNvPicPr>
+            <a:picLocks noChangeAspect="1" noChangeArrowheads="1"/>
+          </p:cNvPicPr>
+          <p:nvPr/>
+        </p:nvPicPr>
+        <p:blipFill>
+          <a:blip r:embed="rId3">
+            <a:extLst>
+              <a:ext uri="{28A0092B-C50C-407E-A947-70E740481C1C}">
+                <a14:useLocalDpi xmlns:a14="http://schemas.microsoft.com/office/drawing/2010/main" val="0"/>
+              </a:ext>
+            </a:extLst>
+          </a:blip>
+          <a:srcRect/>
+          <a:stretch>
+            <a:fillRect/>
+          </a:stretch>
+        </p:blipFill>
+        <p:spPr bwMode="auto">
+          <a:xfrm>
+            <a:off x="4644008" y="4977133"/>
+            <a:ext cx="4073079" cy="1402127"/>
+          </a:xfrm>
+          <a:prstGeom prst="rect">
+            <a:avLst/>
+          </a:prstGeom>
+          <a:noFill/>
+          <a:ln>
+            <a:noFill/>
+          </a:ln>
+          <a:effectLst/>
+          <a:extLst>
+            <a:ext uri="{909E8E84-426E-40DD-AFC4-6F175D3DCCD1}">
+              <a14:hiddenFill xmlns:a14="http://schemas.microsoft.com/office/drawing/2010/main">
+                <a:solidFill>
+                  <a:schemeClr val="accent1"/>
+                </a:solidFill>
+              </a14:hiddenFill>
+            </a:ext>
+            <a:ext uri="{91240B29-F687-4F45-9708-019B960494DF}">
+              <a14:hiddenLine xmlns:a14="http://schemas.microsoft.com/office/drawing/2010/main" w="9525">
+                <a:solidFill>
+                  <a:schemeClr val="tx1"/>
+                </a:solidFill>
+                <a:miter lim="800000"/>
+                <a:headEnd/>
+                <a:tailEnd/>
+              </a14:hiddenLine>
+            </a:ext>
+            <a:ext uri="{AF507438-7753-43E0-B8FC-AC1667EBCBE1}">
+              <a14:hiddenEffects xmlns:a14="http://schemas.microsoft.com/office/drawing/2010/main">
+                <a:effectLst>
+                  <a:outerShdw dist="35921" dir="2700000" algn="ctr" rotWithShape="0">
+                    <a:schemeClr val="bg2"/>
+                  </a:outerShdw>
+                </a:effectLst>
+              </a14:hiddenEffects>
+            </a:ext>
+          </a:extLst>
+        </p:spPr>
+      </p:pic>
+    </p:spTree>
+    <p:extLst>
+      <p:ext uri="{BB962C8B-B14F-4D97-AF65-F5344CB8AC3E}">
+        <p14:creationId xmlns:p14="http://schemas.microsoft.com/office/powerpoint/2010/main" val="537240625"/>
+      </p:ext>
+    </p:extLst>
+  </p:cSld>
+  <p:clrMapOvr>
+    <a:masterClrMapping/>
+  </p:clrMapOvr>
+</p:sld>
+</file>
+
+<file path=ppt/slides/slide5.xml><?xml version="1.0" encoding="utf-8"?>
+<p:sld xmlns:a="http://schemas.openxmlformats.org/drawingml/2006/main" xmlns:r="http://schemas.openxmlformats.org/officeDocument/2006/relationships" xmlns:p="http://schemas.openxmlformats.org/presentationml/2006/main">
+  <p:cSld>
+    <p:spTree>
+      <p:nvGrpSpPr>
+        <p:cNvPr id="1" name=""/>
+        <p:cNvGrpSpPr/>
+        <p:nvPr/>
+      </p:nvGrpSpPr>
+      <p:grpSpPr>
+        <a:xfrm>
+          <a:off x="0" y="0"/>
+          <a:ext cx="0" cy="0"/>
+          <a:chOff x="0" y="0"/>
+          <a:chExt cx="0" cy="0"/>
+        </a:xfrm>
+      </p:grpSpPr>
+      <p:sp>
+        <p:nvSpPr>
+          <p:cNvPr id="2" name="Título 1"/>
+          <p:cNvSpPr>
+            <a:spLocks noGrp="1"/>
+          </p:cNvSpPr>
+          <p:nvPr>
+            <p:ph type="title"/>
+          </p:nvPr>
+        </p:nvSpPr>
+        <p:spPr/>
+        <p:txBody>
+          <a:bodyPr/>
+          <a:lstStyle/>
+          <a:p>
+            <a:r>
+              <a:rPr lang="en-US" dirty="0" smtClean="0"/>
+              <a:t>Point Correspondence</a:t>
+            </a:r>
+            <a:endParaRPr lang="en-US" dirty="0"/>
+          </a:p>
+        </p:txBody>
+      </p:sp>
+      <p:sp>
+        <p:nvSpPr>
+          <p:cNvPr id="3" name="Espaço Reservado para Conteúdo 2"/>
+          <p:cNvSpPr>
+            <a:spLocks noGrp="1"/>
+          </p:cNvSpPr>
+          <p:nvPr>
+            <p:ph idx="1"/>
+          </p:nvPr>
+        </p:nvSpPr>
+        <p:spPr/>
+        <p:txBody>
+          <a:bodyPr/>
+          <a:lstStyle/>
+          <a:p>
+            <a:r>
+              <a:rPr lang="en-US" dirty="0" smtClean="0"/>
+              <a:t>Goal: Find point correspondences between two images</a:t>
+            </a:r>
+          </a:p>
+          <a:p>
+            <a:endParaRPr lang="en-US" b="1" dirty="0"/>
+          </a:p>
+          <a:p>
+            <a:r>
+              <a:rPr lang="en-US" dirty="0" smtClean="0"/>
+              <a:t>Points will be used to</a:t>
+            </a:r>
+          </a:p>
+          <a:p>
+            <a:pPr marL="118872" indent="0">
+              <a:buNone/>
+            </a:pPr>
+            <a:r>
+              <a:rPr lang="en-US" dirty="0" smtClean="0"/>
+              <a:t>    estimate camera</a:t>
+            </a:r>
+          </a:p>
+          <a:p>
+            <a:pPr marL="118872" indent="0">
+              <a:buNone/>
+            </a:pPr>
+            <a:r>
+              <a:rPr lang="en-US" dirty="0" smtClean="0"/>
+              <a:t>    movement</a:t>
+            </a:r>
+            <a:endParaRPr lang="en-US" dirty="0"/>
+          </a:p>
+        </p:txBody>
+      </p:sp>
+      <p:pic>
+        <p:nvPicPr>
+          <p:cNvPr id="4" name="Picture 2"/>
+          <p:cNvPicPr>
+            <a:picLocks noChangeAspect="1" noChangeArrowheads="1"/>
+          </p:cNvPicPr>
+          <p:nvPr/>
+        </p:nvPicPr>
+        <p:blipFill>
+          <a:blip r:embed="rId2">
+            <a:extLst>
+              <a:ext uri="{28A0092B-C50C-407E-A947-70E740481C1C}">
+                <a14:useLocalDpi xmlns:a14="http://schemas.microsoft.com/office/drawing/2010/main" val="0"/>
+              </a:ext>
+            </a:extLst>
+          </a:blip>
+          <a:srcRect/>
+          <a:stretch>
+            <a:fillRect/>
+          </a:stretch>
+        </p:blipFill>
+        <p:spPr bwMode="auto">
+          <a:xfrm>
+            <a:off x="5004048" y="2751820"/>
+            <a:ext cx="3384376" cy="3807423"/>
+          </a:xfrm>
+          <a:prstGeom prst="rect">
+            <a:avLst/>
+          </a:prstGeom>
+          <a:noFill/>
+          <a:ln>
+            <a:noFill/>
+          </a:ln>
+          <a:effectLst/>
+          <a:extLst>
+            <a:ext uri="{909E8E84-426E-40DD-AFC4-6F175D3DCCD1}">
+              <a14:hiddenFill xmlns:a14="http://schemas.microsoft.com/office/drawing/2010/main">
+                <a:solidFill>
+                  <a:schemeClr val="accent1"/>
+                </a:solidFill>
+              </a14:hiddenFill>
+            </a:ext>
+            <a:ext uri="{91240B29-F687-4F45-9708-019B960494DF}">
+              <a14:hiddenLine xmlns:a14="http://schemas.microsoft.com/office/drawing/2010/main" w="9525">
+                <a:solidFill>
+                  <a:schemeClr val="tx1"/>
+                </a:solidFill>
+                <a:miter lim="800000"/>
+                <a:headEnd/>
+                <a:tailEnd/>
+              </a14:hiddenLine>
+            </a:ext>
+            <a:ext uri="{AF507438-7753-43E0-B8FC-AC1667EBCBE1}">
+              <a14:hiddenEffects xmlns:a14="http://schemas.microsoft.com/office/drawing/2010/main">
+                <a:effectLst>
+                  <a:outerShdw dist="35921" dir="2700000" algn="ctr" rotWithShape="0">
+                    <a:schemeClr val="bg2"/>
+                  </a:outerShdw>
+                </a:effectLst>
+              </a14:hiddenEffects>
+            </a:ext>
+          </a:extLst>
+        </p:spPr>
+      </p:pic>
+    </p:spTree>
+    <p:extLst>
+      <p:ext uri="{BB962C8B-B14F-4D97-AF65-F5344CB8AC3E}">
+        <p14:creationId xmlns:p14="http://schemas.microsoft.com/office/powerpoint/2010/main" val="1204927623"/>
+      </p:ext>
+    </p:extLst>
+  </p:cSld>
+  <p:clrMapOvr>
+    <a:masterClrMapping/>
+  </p:clrMapOvr>
+</p:sld>
+</file>
+
+<file path=ppt/slides/slide6.xml><?xml version="1.0" encoding="utf-8"?>
+<p:sld xmlns:a="http://schemas.openxmlformats.org/drawingml/2006/main" xmlns:r="http://schemas.openxmlformats.org/officeDocument/2006/relationships" xmlns:p="http://schemas.openxmlformats.org/presentationml/2006/main">
+  <p:cSld>
+    <p:spTree>
+      <p:nvGrpSpPr>
+        <p:cNvPr id="1" name=""/>
+        <p:cNvGrpSpPr/>
+        <p:nvPr/>
+      </p:nvGrpSpPr>
+      <p:grpSpPr>
+        <a:xfrm>
+          <a:off x="0" y="0"/>
+          <a:ext cx="0" cy="0"/>
+          <a:chOff x="0" y="0"/>
+          <a:chExt cx="0" cy="0"/>
+        </a:xfrm>
+      </p:grpSpPr>
+      <p:sp>
+        <p:nvSpPr>
+          <p:cNvPr id="2" name="Título 1"/>
+          <p:cNvSpPr>
+            <a:spLocks noGrp="1"/>
+          </p:cNvSpPr>
+          <p:nvPr>
+            <p:ph type="title"/>
+          </p:nvPr>
+        </p:nvSpPr>
+        <p:spPr/>
+        <p:txBody>
+          <a:bodyPr/>
+          <a:lstStyle/>
+          <a:p>
+            <a:r>
+              <a:rPr lang="en-US" dirty="0" smtClean="0"/>
+              <a:t>Point Correspondence</a:t>
+            </a:r>
+            <a:endParaRPr lang="en-US" dirty="0"/>
+          </a:p>
+        </p:txBody>
+      </p:sp>
+      <p:sp>
+        <p:nvSpPr>
+          <p:cNvPr id="3" name="Espaço Reservado para Conteúdo 2"/>
+          <p:cNvSpPr>
+            <a:spLocks noGrp="1"/>
+          </p:cNvSpPr>
+          <p:nvPr>
+            <p:ph idx="1"/>
+          </p:nvPr>
+        </p:nvSpPr>
+        <p:spPr/>
+        <p:txBody>
+          <a:bodyPr/>
+          <a:lstStyle/>
+          <a:p>
+            <a:r>
+              <a:rPr lang="en-US" dirty="0" err="1" smtClean="0"/>
+              <a:t>Kanade</a:t>
+            </a:r>
+            <a:r>
+              <a:rPr lang="en-US" dirty="0" smtClean="0"/>
+              <a:t>-Lucas-</a:t>
+            </a:r>
+            <a:r>
+              <a:rPr lang="en-US" dirty="0" err="1" smtClean="0"/>
+              <a:t>Tomasi</a:t>
+            </a:r>
+            <a:endParaRPr lang="en-US" dirty="0" smtClean="0"/>
+          </a:p>
+          <a:p>
+            <a:pPr lvl="1"/>
+            <a:r>
+              <a:rPr lang="en-US" dirty="0" smtClean="0"/>
+              <a:t>Results were not satisfactory</a:t>
+            </a:r>
+          </a:p>
+          <a:p>
+            <a:pPr lvl="1"/>
+            <a:r>
+              <a:rPr lang="en-US" dirty="0" smtClean="0"/>
+              <a:t>Sequences with movement had around 10 matches</a:t>
+            </a:r>
+          </a:p>
+          <a:p>
+            <a:pPr lvl="1"/>
+            <a:endParaRPr lang="en-US" dirty="0"/>
+          </a:p>
+          <a:p>
+            <a:r>
+              <a:rPr lang="en-US" dirty="0" smtClean="0"/>
+              <a:t>SIFT:  </a:t>
+            </a:r>
+            <a:r>
+              <a:rPr lang="en-US" dirty="0"/>
+              <a:t>Scale-invariant feature </a:t>
+            </a:r>
+            <a:r>
+              <a:rPr lang="en-US" dirty="0" smtClean="0"/>
+              <a:t>transform</a:t>
+            </a:r>
+          </a:p>
+          <a:p>
+            <a:pPr lvl="1"/>
+            <a:r>
+              <a:rPr lang="en-US" dirty="0" smtClean="0"/>
+              <a:t>Much better performance</a:t>
+            </a:r>
+            <a:endParaRPr lang="en-US" dirty="0"/>
+          </a:p>
+        </p:txBody>
+      </p:sp>
+    </p:spTree>
+    <p:extLst>
+      <p:ext uri="{BB962C8B-B14F-4D97-AF65-F5344CB8AC3E}">
+        <p14:creationId xmlns:p14="http://schemas.microsoft.com/office/powerpoint/2010/main" val="417128218"/>
+      </p:ext>
+    </p:extLst>
+  </p:cSld>
+  <p:clrMapOvr>
+    <a:masterClrMapping/>
+  </p:clrMapOvr>
+</p:sld>
+</file>
+
+<file path=ppt/slides/slide7.xml><?xml version="1.0" encoding="utf-8"?>
+<p:sld xmlns:a="http://schemas.openxmlformats.org/drawingml/2006/main" xmlns:r="http://schemas.openxmlformats.org/officeDocument/2006/relationships" xmlns:p="http://schemas.openxmlformats.org/presentationml/2006/main">
+  <p:cSld>
+    <p:spTree>
+      <p:nvGrpSpPr>
+        <p:cNvPr id="1" name=""/>
+        <p:cNvGrpSpPr/>
+        <p:nvPr/>
+      </p:nvGrpSpPr>
+      <p:grpSpPr>
+        <a:xfrm>
+          <a:off x="0" y="0"/>
+          <a:ext cx="0" cy="0"/>
+          <a:chOff x="0" y="0"/>
+          <a:chExt cx="0" cy="0"/>
+        </a:xfrm>
+      </p:grpSpPr>
+      <p:sp>
+        <p:nvSpPr>
+          <p:cNvPr id="2" name="Título 1"/>
+          <p:cNvSpPr>
+            <a:spLocks noGrp="1"/>
+          </p:cNvSpPr>
+          <p:nvPr>
+            <p:ph type="title"/>
+          </p:nvPr>
+        </p:nvSpPr>
+        <p:spPr/>
+        <p:txBody>
+          <a:bodyPr/>
+          <a:lstStyle/>
+          <a:p>
+            <a:r>
+              <a:rPr lang="en-US" dirty="0" err="1" smtClean="0"/>
+              <a:t>Homography</a:t>
+            </a:r>
+            <a:r>
+              <a:rPr lang="en-US" dirty="0" smtClean="0"/>
+              <a:t> Estimation</a:t>
+            </a:r>
+            <a:endParaRPr lang="en-US" dirty="0"/>
+          </a:p>
+        </p:txBody>
+      </p:sp>
+      <p:sp>
+        <p:nvSpPr>
+          <p:cNvPr id="3" name="Espaço Reservado para Conteúdo 2"/>
+          <p:cNvSpPr>
+            <a:spLocks noGrp="1"/>
+          </p:cNvSpPr>
+          <p:nvPr>
+            <p:ph idx="1"/>
+          </p:nvPr>
+        </p:nvSpPr>
+        <p:spPr/>
+        <p:txBody>
+          <a:bodyPr/>
+          <a:lstStyle/>
+          <a:p>
+            <a:r>
+              <a:rPr lang="en-US" dirty="0" smtClean="0"/>
+              <a:t>Estimate a matrix that maps the points in one image to the points on the other</a:t>
+            </a:r>
+          </a:p>
+          <a:p>
+            <a:pPr lvl="1"/>
+            <a:endParaRPr lang="en-US" dirty="0"/>
+          </a:p>
+          <a:p>
+            <a:r>
+              <a:rPr lang="en-US" dirty="0" smtClean="0"/>
+              <a:t>Simple least squares approach lead to problems</a:t>
+            </a:r>
+            <a:endParaRPr lang="en-US" dirty="0"/>
+          </a:p>
+        </p:txBody>
+      </p:sp>
+    </p:spTree>
+    <p:extLst>
+      <p:ext uri="{BB962C8B-B14F-4D97-AF65-F5344CB8AC3E}">
+        <p14:creationId xmlns:p14="http://schemas.microsoft.com/office/powerpoint/2010/main" val="2228738363"/>
+      </p:ext>
+    </p:extLst>
+  </p:cSld>
+  <p:clrMapOvr>
+    <a:masterClrMapping/>
+  </p:clrMapOvr>
+</p:sld>
+</file>
+
+<file path=ppt/slides/slide8.xml><?xml version="1.0" encoding="utf-8"?>
+<p:sld xmlns:a="http://schemas.openxmlformats.org/drawingml/2006/main" xmlns:r="http://schemas.openxmlformats.org/officeDocument/2006/relationships" xmlns:p="http://schemas.openxmlformats.org/presentationml/2006/main">
+  <p:cSld>
+    <p:spTree>
+      <p:nvGrpSpPr>
+        <p:cNvPr id="1" name=""/>
+        <p:cNvGrpSpPr/>
+        <p:nvPr/>
+      </p:nvGrpSpPr>
+      <p:grpSpPr>
+        <a:xfrm>
+          <a:off x="0" y="0"/>
+          <a:ext cx="0" cy="0"/>
+          <a:chOff x="0" y="0"/>
+          <a:chExt cx="0" cy="0"/>
+        </a:xfrm>
+      </p:grpSpPr>
+      <p:sp>
+        <p:nvSpPr>
+          <p:cNvPr id="2" name="Título 1"/>
+          <p:cNvSpPr>
+            <a:spLocks noGrp="1"/>
+          </p:cNvSpPr>
+          <p:nvPr>
+            <p:ph type="title"/>
+          </p:nvPr>
+        </p:nvSpPr>
+        <p:spPr/>
+        <p:txBody>
+          <a:bodyPr>
+            <a:normAutofit/>
+          </a:bodyPr>
+          <a:lstStyle/>
+          <a:p>
+            <a:r>
+              <a:rPr lang="en-US" dirty="0" err="1" smtClean="0"/>
+              <a:t>Homography</a:t>
+            </a:r>
+            <a:r>
+              <a:rPr lang="en-US" dirty="0" smtClean="0"/>
+              <a:t> Estimation</a:t>
+            </a:r>
+            <a:endParaRPr lang="en-US" dirty="0"/>
+          </a:p>
+        </p:txBody>
+      </p:sp>
+      <p:sp>
+        <p:nvSpPr>
+          <p:cNvPr id="3" name="Espaço Reservado para Conteúdo 2"/>
+          <p:cNvSpPr>
+            <a:spLocks noGrp="1"/>
+          </p:cNvSpPr>
+          <p:nvPr>
+            <p:ph idx="1"/>
+          </p:nvPr>
+        </p:nvSpPr>
+        <p:spPr/>
+        <p:txBody>
+          <a:bodyPr/>
+          <a:lstStyle/>
+          <a:p>
+            <a:r>
+              <a:rPr lang="en-US" dirty="0" smtClean="0"/>
+              <a:t>RANSAC</a:t>
+            </a:r>
+          </a:p>
+          <a:p>
+            <a:pPr lvl="1"/>
+            <a:endParaRPr lang="en-US" dirty="0"/>
+          </a:p>
+        </p:txBody>
+      </p:sp>
+    </p:spTree>
+    <p:extLst>
+      <p:ext uri="{BB962C8B-B14F-4D97-AF65-F5344CB8AC3E}">
+        <p14:creationId xmlns:p14="http://schemas.microsoft.com/office/powerpoint/2010/main" val="411066350"/>
+      </p:ext>
+    </p:extLst>
+  </p:cSld>
+  <p:clrMapOvr>
+    <a:masterClrMapping/>
+  </p:clrMapOvr>
+</p:sld>
+</file>
+
+<file path=ppt/slides/slide9.xml><?xml version="1.0" encoding="utf-8"?>
+<p:sld xmlns:a="http://schemas.openxmlformats.org/drawingml/2006/main" xmlns:r="http://schemas.openxmlformats.org/officeDocument/2006/relationships" xmlns:p="http://schemas.openxmlformats.org/presentationml/2006/main">
+  <p:cSld>
+    <p:spTree>
+      <p:nvGrpSpPr>
+        <p:cNvPr id="1" name=""/>
+        <p:cNvGrpSpPr/>
+        <p:nvPr/>
+      </p:nvGrpSpPr>
+      <p:grpSpPr>
+        <a:xfrm>
+          <a:off x="0" y="0"/>
+          <a:ext cx="0" cy="0"/>
+          <a:chOff x="0" y="0"/>
+          <a:chExt cx="0" cy="0"/>
+        </a:xfrm>
+      </p:grpSpPr>
+      <p:sp>
+        <p:nvSpPr>
+          <p:cNvPr id="2" name="Título 1"/>
+          <p:cNvSpPr>
+            <a:spLocks noGrp="1"/>
+          </p:cNvSpPr>
+          <p:nvPr>
+            <p:ph type="title"/>
+          </p:nvPr>
+        </p:nvSpPr>
+        <p:spPr/>
+        <p:txBody>
+          <a:bodyPr>
+            <a:normAutofit/>
+          </a:bodyPr>
+          <a:lstStyle/>
+          <a:p>
+            <a:r>
+              <a:rPr lang="en-US"/>
+              <a:t>Video </a:t>
+            </a:r>
+            <a:r>
+              <a:rPr lang="en-US" smtClean="0"/>
+              <a:t>Reproduction</a:t>
+            </a:r>
+            <a:endParaRPr lang="en-US" dirty="0"/>
+          </a:p>
+        </p:txBody>
+      </p:sp>
+      <p:sp>
+        <p:nvSpPr>
+          <p:cNvPr id="3" name="Espaço Reservado para Conteúdo 2"/>
+          <p:cNvSpPr>
+            <a:spLocks noGrp="1"/>
+          </p:cNvSpPr>
+          <p:nvPr>
+            <p:ph idx="1"/>
+          </p:nvPr>
+        </p:nvSpPr>
+        <p:spPr/>
+        <p:txBody>
+          <a:bodyPr/>
+          <a:lstStyle/>
+          <a:p>
+            <a:r>
+              <a:rPr lang="en-US" dirty="0" smtClean="0"/>
+              <a:t>Inverse of the </a:t>
+            </a:r>
+            <a:r>
+              <a:rPr lang="en-US" dirty="0" err="1" smtClean="0"/>
+              <a:t>homography</a:t>
+            </a:r>
+            <a:r>
+              <a:rPr lang="en-US" dirty="0" smtClean="0"/>
+              <a:t> is used to transform the camera</a:t>
+            </a:r>
+          </a:p>
+          <a:p>
+            <a:pPr lvl="1"/>
+            <a:endParaRPr lang="en-US" dirty="0"/>
+          </a:p>
+        </p:txBody>
+      </p:sp>
+    </p:spTree>
+    <p:extLst>
+      <p:ext uri="{BB962C8B-B14F-4D97-AF65-F5344CB8AC3E}">
+        <p14:creationId xmlns:p14="http://schemas.microsoft.com/office/powerpoint/2010/main" val="4285295048"/>
       </p:ext>
     </p:extLst>
   </p:cSld>

</xml_diff>